<commit_message>
Se agrega el primer cambio en mi horario
</commit_message>
<xml_diff>
--- a/ME_PROGRAMO.pptx
+++ b/ME_PROGRAMO.pptx
@@ -111,19 +111,55 @@
       </a:defRPr>
     </a:lvl9pPr>
   </p:defaultTextStyle>
+  <p:extLst>
+    <p:ext uri="{EFAFB233-063F-42B5-8137-9DF3F51BA10A}">
+      <p15:sldGuideLst xmlns:p15="http://schemas.microsoft.com/office/powerpoint/2012/main"/>
+    </p:ext>
+  </p:extLst>
 </p:presentation>
-</file>
-
-<file path=ppt/revisionInfo.xml><?xml version="1.0" encoding="utf-8"?>
-<p1510:revInfo xmlns:a="http://schemas.openxmlformats.org/drawingml/2006/main" xmlns:r="http://schemas.openxmlformats.org/officeDocument/2006/relationships" xmlns:p1510="http://schemas.microsoft.com/office/powerpoint/2015/10/main">
-  <p1510:revLst>
-    <p1510:client id="{A567618E-9E6C-4EA7-A5E4-E679CB3C9A01}" v="9" dt="2023-02-12T23:56:54.205"/>
-  </p1510:revLst>
-</p1510:revInfo>
 </file>
 
 <file path=ppt/changesInfos/changesInfo1.xml><?xml version="1.0" encoding="utf-8"?>
 <pc:chgInfo xmlns:a="http://schemas.openxmlformats.org/drawingml/2006/main" xmlns:r="http://schemas.openxmlformats.org/officeDocument/2006/relationships" xmlns:ac="http://schemas.microsoft.com/office/drawing/2013/main/command" xmlns:pc="http://schemas.microsoft.com/office/powerpoint/2013/main/command">
+  <pc:docChgLst>
+    <pc:chgData name="Alejandro 👶🏻" userId="0aec8380aec6db77" providerId="LiveId" clId="{3E37F1C1-DAC9-4E9B-B4B2-10A6D0CD4B42}"/>
+    <pc:docChg chg="custSel modSld">
+      <pc:chgData name="Alejandro 👶🏻" userId="0aec8380aec6db77" providerId="LiveId" clId="{3E37F1C1-DAC9-4E9B-B4B2-10A6D0CD4B42}" dt="2023-02-21T01:41:33.364" v="53" actId="20577"/>
+      <pc:docMkLst>
+        <pc:docMk/>
+      </pc:docMkLst>
+      <pc:sldChg chg="modSp mod">
+        <pc:chgData name="Alejandro 👶🏻" userId="0aec8380aec6db77" providerId="LiveId" clId="{3E37F1C1-DAC9-4E9B-B4B2-10A6D0CD4B42}" dt="2023-02-21T01:41:03.492" v="23" actId="20577"/>
+        <pc:sldMkLst>
+          <pc:docMk/>
+          <pc:sldMk cId="4105977075" sldId="256"/>
+        </pc:sldMkLst>
+        <pc:graphicFrameChg chg="modGraphic">
+          <ac:chgData name="Alejandro 👶🏻" userId="0aec8380aec6db77" providerId="LiveId" clId="{3E37F1C1-DAC9-4E9B-B4B2-10A6D0CD4B42}" dt="2023-02-21T01:41:03.492" v="23" actId="20577"/>
+          <ac:graphicFrameMkLst>
+            <pc:docMk/>
+            <pc:sldMk cId="4105977075" sldId="256"/>
+            <ac:graphicFrameMk id="5" creationId="{039394FA-6D0A-F88B-6C8E-EDDA7AF66426}"/>
+          </ac:graphicFrameMkLst>
+        </pc:graphicFrameChg>
+      </pc:sldChg>
+      <pc:sldChg chg="modSp mod">
+        <pc:chgData name="Alejandro 👶🏻" userId="0aec8380aec6db77" providerId="LiveId" clId="{3E37F1C1-DAC9-4E9B-B4B2-10A6D0CD4B42}" dt="2023-02-21T01:41:33.364" v="53" actId="20577"/>
+        <pc:sldMkLst>
+          <pc:docMk/>
+          <pc:sldMk cId="3922996544" sldId="257"/>
+        </pc:sldMkLst>
+        <pc:graphicFrameChg chg="modGraphic">
+          <ac:chgData name="Alejandro 👶🏻" userId="0aec8380aec6db77" providerId="LiveId" clId="{3E37F1C1-DAC9-4E9B-B4B2-10A6D0CD4B42}" dt="2023-02-21T01:41:33.364" v="53" actId="20577"/>
+          <ac:graphicFrameMkLst>
+            <pc:docMk/>
+            <pc:sldMk cId="3922996544" sldId="257"/>
+            <ac:graphicFrameMk id="2" creationId="{049396C0-9BF9-C4A0-946F-037C25DD4D67}"/>
+          </ac:graphicFrameMkLst>
+        </pc:graphicFrameChg>
+      </pc:sldChg>
+    </pc:docChg>
+  </pc:docChgLst>
   <pc:docChgLst>
     <pc:chgData name="Alejandro 👶🏻" userId="0aec8380aec6db77" providerId="LiveId" clId="{A567618E-9E6C-4EA7-A5E4-E679CB3C9A01}"/>
     <pc:docChg chg="undo custSel addSld modSld sldOrd">
@@ -437,7 +473,7 @@
           <a:p>
             <a:fld id="{D7B0C96E-8B14-4694-A856-B78264AE7455}" type="datetimeFigureOut">
               <a:rPr lang="es-CO" smtClean="0"/>
-              <a:t>12/02/2023</a:t>
+              <a:t>20/02/2023</a:t>
             </a:fld>
             <a:endParaRPr lang="es-CO"/>
           </a:p>
@@ -637,7 +673,7 @@
           <a:p>
             <a:fld id="{D7B0C96E-8B14-4694-A856-B78264AE7455}" type="datetimeFigureOut">
               <a:rPr lang="es-CO" smtClean="0"/>
-              <a:t>12/02/2023</a:t>
+              <a:t>20/02/2023</a:t>
             </a:fld>
             <a:endParaRPr lang="es-CO"/>
           </a:p>
@@ -847,7 +883,7 @@
           <a:p>
             <a:fld id="{D7B0C96E-8B14-4694-A856-B78264AE7455}" type="datetimeFigureOut">
               <a:rPr lang="es-CO" smtClean="0"/>
-              <a:t>12/02/2023</a:t>
+              <a:t>20/02/2023</a:t>
             </a:fld>
             <a:endParaRPr lang="es-CO"/>
           </a:p>
@@ -1047,7 +1083,7 @@
           <a:p>
             <a:fld id="{D7B0C96E-8B14-4694-A856-B78264AE7455}" type="datetimeFigureOut">
               <a:rPr lang="es-CO" smtClean="0"/>
-              <a:t>12/02/2023</a:t>
+              <a:t>20/02/2023</a:t>
             </a:fld>
             <a:endParaRPr lang="es-CO"/>
           </a:p>
@@ -1323,7 +1359,7 @@
           <a:p>
             <a:fld id="{D7B0C96E-8B14-4694-A856-B78264AE7455}" type="datetimeFigureOut">
               <a:rPr lang="es-CO" smtClean="0"/>
-              <a:t>12/02/2023</a:t>
+              <a:t>20/02/2023</a:t>
             </a:fld>
             <a:endParaRPr lang="es-CO"/>
           </a:p>
@@ -1591,7 +1627,7 @@
           <a:p>
             <a:fld id="{D7B0C96E-8B14-4694-A856-B78264AE7455}" type="datetimeFigureOut">
               <a:rPr lang="es-CO" smtClean="0"/>
-              <a:t>12/02/2023</a:t>
+              <a:t>20/02/2023</a:t>
             </a:fld>
             <a:endParaRPr lang="es-CO"/>
           </a:p>
@@ -2006,7 +2042,7 @@
           <a:p>
             <a:fld id="{D7B0C96E-8B14-4694-A856-B78264AE7455}" type="datetimeFigureOut">
               <a:rPr lang="es-CO" smtClean="0"/>
-              <a:t>12/02/2023</a:t>
+              <a:t>20/02/2023</a:t>
             </a:fld>
             <a:endParaRPr lang="es-CO"/>
           </a:p>
@@ -2148,7 +2184,7 @@
           <a:p>
             <a:fld id="{D7B0C96E-8B14-4694-A856-B78264AE7455}" type="datetimeFigureOut">
               <a:rPr lang="es-CO" smtClean="0"/>
-              <a:t>12/02/2023</a:t>
+              <a:t>20/02/2023</a:t>
             </a:fld>
             <a:endParaRPr lang="es-CO"/>
           </a:p>
@@ -2261,7 +2297,7 @@
           <a:p>
             <a:fld id="{D7B0C96E-8B14-4694-A856-B78264AE7455}" type="datetimeFigureOut">
               <a:rPr lang="es-CO" smtClean="0"/>
-              <a:t>12/02/2023</a:t>
+              <a:t>20/02/2023</a:t>
             </a:fld>
             <a:endParaRPr lang="es-CO"/>
           </a:p>
@@ -2574,7 +2610,7 @@
           <a:p>
             <a:fld id="{D7B0C96E-8B14-4694-A856-B78264AE7455}" type="datetimeFigureOut">
               <a:rPr lang="es-CO" smtClean="0"/>
-              <a:t>12/02/2023</a:t>
+              <a:t>20/02/2023</a:t>
             </a:fld>
             <a:endParaRPr lang="es-CO"/>
           </a:p>
@@ -2863,7 +2899,7 @@
           <a:p>
             <a:fld id="{D7B0C96E-8B14-4694-A856-B78264AE7455}" type="datetimeFigureOut">
               <a:rPr lang="es-CO" smtClean="0"/>
-              <a:t>12/02/2023</a:t>
+              <a:t>20/02/2023</a:t>
             </a:fld>
             <a:endParaRPr lang="es-CO"/>
           </a:p>
@@ -3106,7 +3142,7 @@
           <a:p>
             <a:fld id="{D7B0C96E-8B14-4694-A856-B78264AE7455}" type="datetimeFigureOut">
               <a:rPr lang="es-CO" smtClean="0"/>
-              <a:t>12/02/2023</a:t>
+              <a:t>20/02/2023</a:t>
             </a:fld>
             <a:endParaRPr lang="es-CO"/>
           </a:p>
@@ -3538,14 +3574,14 @@
           <p:nvPr>
             <p:extLst>
               <p:ext uri="{D42A27DB-BD31-4B8C-83A1-F6EECF244321}">
-                <p14:modId xmlns:p14="http://schemas.microsoft.com/office/powerpoint/2010/main" val="3841007693"/>
+                <p14:modId xmlns:p14="http://schemas.microsoft.com/office/powerpoint/2010/main" val="673763525"/>
               </p:ext>
             </p:extLst>
           </p:nvPr>
         </p:nvGraphicFramePr>
         <p:xfrm>
           <a:off x="0" y="-92468"/>
-          <a:ext cx="9791272" cy="7480237"/>
+          <a:ext cx="9791272" cy="7409117"/>
         </p:xfrm>
         <a:graphic>
           <a:graphicData uri="http://schemas.openxmlformats.org/drawingml/2006/table">
@@ -4701,7 +4737,7 @@
                   </a:txBody>
                   <a:tcPr/>
                 </a:tc>
-                <a:tc>
+                <a:tc rowSpan="5">
                   <a:txBody>
                     <a:bodyPr/>
                     <a:lstStyle/>
@@ -4709,7 +4745,7 @@
                       <a:pPr algn="ctr"/>
                       <a:r>
                         <a:rPr lang="en-US" sz="1400" dirty="0"/>
-                        <a:t>Descanso </a:t>
+                        <a:t>Salida con mis amigos</a:t>
                       </a:r>
                       <a:endParaRPr lang="es-CO" sz="1400" dirty="0"/>
                     </a:p>
@@ -4749,7 +4785,7 @@
                 </a:extLst>
               </a:tr>
               <a:tr h="280650">
-                <a:tc rowSpan="4">
+                <a:tc rowSpan="3">
                   <a:txBody>
                     <a:bodyPr/>
                     <a:lstStyle/>
@@ -4763,7 +4799,7 @@
                   </a:txBody>
                   <a:tcPr/>
                 </a:tc>
-                <a:tc rowSpan="3">
+                <a:tc vMerge="1">
                   <a:txBody>
                     <a:bodyPr/>
                     <a:lstStyle/>
@@ -4844,7 +4880,7 @@
                   </a:txBody>
                   <a:tcPr/>
                 </a:tc>
-                <a:tc rowSpan="4">
+                <a:tc rowSpan="3">
                   <a:txBody>
                     <a:bodyPr/>
                     <a:lstStyle/>
@@ -4864,7 +4900,7 @@
                   </a:ext>
                 </a:extLst>
               </a:tr>
-              <a:tr h="0">
+              <a:tr h="185380">
                 <a:tc vMerge="1">
                   <a:txBody>
                     <a:bodyPr/>
@@ -4885,7 +4921,7 @@
                   </a:txBody>
                   <a:tcPr/>
                 </a:tc>
-                <a:tc rowSpan="3">
+                <a:tc rowSpan="2">
                   <a:txBody>
                     <a:bodyPr/>
                     <a:lstStyle/>
@@ -4917,62 +4953,6 @@
                 <a:extLst>
                   <a:ext uri="{0D108BD9-81ED-4DB2-BD59-A6C34878D82A}">
                     <a16:rowId xmlns:a16="http://schemas.microsoft.com/office/drawing/2014/main" val="3572966854"/>
-                  </a:ext>
-                </a:extLst>
-              </a:tr>
-              <a:tr h="185380">
-                <a:tc vMerge="1">
-                  <a:txBody>
-                    <a:bodyPr/>
-                    <a:lstStyle/>
-                    <a:p>
-                      <a:endParaRPr lang="es-CO"/>
-                    </a:p>
-                  </a:txBody>
-                  <a:tcPr/>
-                </a:tc>
-                <a:tc rowSpan="2">
-                  <a:txBody>
-                    <a:bodyPr/>
-                    <a:lstStyle/>
-                    <a:p>
-                      <a:pPr algn="ctr"/>
-                      <a:r>
-                        <a:rPr lang="en-US" sz="1400" dirty="0" err="1"/>
-                        <a:t>Estudio</a:t>
-                      </a:r>
-                      <a:r>
-                        <a:rPr lang="en-US" sz="1400" dirty="0"/>
-                        <a:t> Independiente </a:t>
-                      </a:r>
-                      <a:endParaRPr lang="es-CO" sz="1400" dirty="0"/>
-                    </a:p>
-                  </a:txBody>
-                  <a:tcPr/>
-                </a:tc>
-                <a:tc vMerge="1">
-                  <a:txBody>
-                    <a:bodyPr/>
-                    <a:lstStyle/>
-                    <a:p>
-                      <a:endParaRPr lang="es-CO"/>
-                    </a:p>
-                  </a:txBody>
-                  <a:tcPr/>
-                </a:tc>
-                <a:tc vMerge="1">
-                  <a:txBody>
-                    <a:bodyPr/>
-                    <a:lstStyle/>
-                    <a:p>
-                      <a:endParaRPr lang="es-CO"/>
-                    </a:p>
-                  </a:txBody>
-                  <a:tcPr/>
-                </a:tc>
-                <a:extLst>
-                  <a:ext uri="{0D108BD9-81ED-4DB2-BD59-A6C34878D82A}">
-                    <a16:rowId xmlns:a16="http://schemas.microsoft.com/office/drawing/2014/main" val="1340906663"/>
                   </a:ext>
                 </a:extLst>
               </a:tr>
@@ -5499,7 +5479,7 @@
           <p:nvPr>
             <p:extLst>
               <p:ext uri="{D42A27DB-BD31-4B8C-83A1-F6EECF244321}">
-                <p14:modId xmlns:p14="http://schemas.microsoft.com/office/powerpoint/2010/main" val="3711599040"/>
+                <p14:modId xmlns:p14="http://schemas.microsoft.com/office/powerpoint/2010/main" val="2737521780"/>
               </p:ext>
             </p:extLst>
           </p:nvPr>
@@ -5940,9 +5920,10 @@
                     <a:p>
                       <a:pPr algn="ctr"/>
                       <a:r>
-                        <a:rPr lang="es-CO" sz="1400" dirty="0"/>
-                        <a:t>Descanso</a:t>
-                      </a:r>
+                        <a:rPr lang="es-CO" sz="1400"/>
+                        <a:t>Estudio Independiente </a:t>
+                      </a:r>
+                      <a:endParaRPr lang="es-CO" sz="1400" dirty="0"/>
                     </a:p>
                   </a:txBody>
                   <a:tcPr/>

</xml_diff>

<commit_message>
Se agrega cambio del dia jueves 16 de febrero en la noche
</commit_message>
<xml_diff>
--- a/ME_PROGRAMO.pptx
+++ b/ME_PROGRAMO.pptx
@@ -123,13 +123,13 @@
 <pc:chgInfo xmlns:a="http://schemas.openxmlformats.org/drawingml/2006/main" xmlns:r="http://schemas.openxmlformats.org/officeDocument/2006/relationships" xmlns:ac="http://schemas.microsoft.com/office/drawing/2013/main/command" xmlns:pc="http://schemas.microsoft.com/office/powerpoint/2013/main/command">
   <pc:docChgLst>
     <pc:chgData name="Alejandro 👶🏻" userId="0aec8380aec6db77" providerId="LiveId" clId="{3E37F1C1-DAC9-4E9B-B4B2-10A6D0CD4B42}"/>
-    <pc:docChg chg="custSel modSld">
-      <pc:chgData name="Alejandro 👶🏻" userId="0aec8380aec6db77" providerId="LiveId" clId="{3E37F1C1-DAC9-4E9B-B4B2-10A6D0CD4B42}" dt="2023-02-21T01:41:33.364" v="53" actId="20577"/>
+    <pc:docChg chg="undo custSel modSld">
+      <pc:chgData name="Alejandro 👶🏻" userId="0aec8380aec6db77" providerId="LiveId" clId="{3E37F1C1-DAC9-4E9B-B4B2-10A6D0CD4B42}" dt="2023-02-21T03:16:12.783" v="151" actId="20577"/>
       <pc:docMkLst>
         <pc:docMk/>
       </pc:docMkLst>
       <pc:sldChg chg="modSp mod">
-        <pc:chgData name="Alejandro 👶🏻" userId="0aec8380aec6db77" providerId="LiveId" clId="{3E37F1C1-DAC9-4E9B-B4B2-10A6D0CD4B42}" dt="2023-02-21T01:41:03.492" v="23" actId="20577"/>
+        <pc:chgData name="Alejandro 👶🏻" userId="0aec8380aec6db77" providerId="LiveId" clId="{3E37F1C1-DAC9-4E9B-B4B2-10A6D0CD4B42}" dt="2023-02-21T03:15:54.406" v="116" actId="20577"/>
         <pc:sldMkLst>
           <pc:docMk/>
           <pc:sldMk cId="4105977075" sldId="256"/>
@@ -142,15 +142,23 @@
             <ac:graphicFrameMk id="5" creationId="{039394FA-6D0A-F88B-6C8E-EDDA7AF66426}"/>
           </ac:graphicFrameMkLst>
         </pc:graphicFrameChg>
+        <pc:graphicFrameChg chg="modGraphic">
+          <ac:chgData name="Alejandro 👶🏻" userId="0aec8380aec6db77" providerId="LiveId" clId="{3E37F1C1-DAC9-4E9B-B4B2-10A6D0CD4B42}" dt="2023-02-21T03:15:54.406" v="116" actId="20577"/>
+          <ac:graphicFrameMkLst>
+            <pc:docMk/>
+            <pc:sldMk cId="4105977075" sldId="256"/>
+            <ac:graphicFrameMk id="9" creationId="{389D1D65-C44D-ABBE-315A-2B88849C5EF8}"/>
+          </ac:graphicFrameMkLst>
+        </pc:graphicFrameChg>
       </pc:sldChg>
       <pc:sldChg chg="modSp mod">
-        <pc:chgData name="Alejandro 👶🏻" userId="0aec8380aec6db77" providerId="LiveId" clId="{3E37F1C1-DAC9-4E9B-B4B2-10A6D0CD4B42}" dt="2023-02-21T01:41:33.364" v="53" actId="20577"/>
+        <pc:chgData name="Alejandro 👶🏻" userId="0aec8380aec6db77" providerId="LiveId" clId="{3E37F1C1-DAC9-4E9B-B4B2-10A6D0CD4B42}" dt="2023-02-21T03:16:12.783" v="151" actId="20577"/>
         <pc:sldMkLst>
           <pc:docMk/>
           <pc:sldMk cId="3922996544" sldId="257"/>
         </pc:sldMkLst>
         <pc:graphicFrameChg chg="modGraphic">
-          <ac:chgData name="Alejandro 👶🏻" userId="0aec8380aec6db77" providerId="LiveId" clId="{3E37F1C1-DAC9-4E9B-B4B2-10A6D0CD4B42}" dt="2023-02-21T01:41:33.364" v="53" actId="20577"/>
+          <ac:chgData name="Alejandro 👶🏻" userId="0aec8380aec6db77" providerId="LiveId" clId="{3E37F1C1-DAC9-4E9B-B4B2-10A6D0CD4B42}" dt="2023-02-21T03:16:12.783" v="151" actId="20577"/>
           <ac:graphicFrameMkLst>
             <pc:docMk/>
             <pc:sldMk cId="3922996544" sldId="257"/>
@@ -5110,7 +5118,7 @@
           <p:nvPr>
             <p:extLst>
               <p:ext uri="{D42A27DB-BD31-4B8C-83A1-F6EECF244321}">
-                <p14:modId xmlns:p14="http://schemas.microsoft.com/office/powerpoint/2010/main" val="4127685739"/>
+                <p14:modId xmlns:p14="http://schemas.microsoft.com/office/powerpoint/2010/main" val="3492618557"/>
               </p:ext>
             </p:extLst>
           </p:nvPr>
@@ -5397,7 +5405,7 @@
                       <a:pPr algn="ctr"/>
                       <a:r>
                         <a:rPr lang="es-CO" sz="1400" dirty="0"/>
-                        <a:t>Estudio Independiente </a:t>
+                        <a:t>Mercado </a:t>
                       </a:r>
                     </a:p>
                   </a:txBody>
@@ -5479,7 +5487,7 @@
           <p:nvPr>
             <p:extLst>
               <p:ext uri="{D42A27DB-BD31-4B8C-83A1-F6EECF244321}">
-                <p14:modId xmlns:p14="http://schemas.microsoft.com/office/powerpoint/2010/main" val="2737521780"/>
+                <p14:modId xmlns:p14="http://schemas.microsoft.com/office/powerpoint/2010/main" val="3375693346"/>
               </p:ext>
             </p:extLst>
           </p:nvPr>
@@ -6713,9 +6721,10 @@
                     <a:p>
                       <a:pPr algn="ctr"/>
                       <a:r>
-                        <a:rPr lang="es-CO" sz="1400" dirty="0"/>
-                        <a:t>Descanso</a:t>
-                      </a:r>
+                        <a:rPr lang="es-CO" sz="1400"/>
+                        <a:t>Estudio Independiente</a:t>
+                      </a:r>
+                      <a:endParaRPr lang="es-CO" sz="1400" dirty="0"/>
                     </a:p>
                   </a:txBody>
                   <a:tcPr/>

</xml_diff>